<commit_message>
Update to download list
</commit_message>
<xml_diff>
--- a/Course Materials/Github.pptx
+++ b/Course Materials/Github.pptx
@@ -112,6 +112,11 @@
       </a:defRPr>
     </a:lvl9pPr>
   </p:defaultTextStyle>
+  <p:extLst>
+    <p:ext uri="{EFAFB233-063F-42B5-8137-9DF3F51BA10A}">
+      <p15:sldGuideLst xmlns:p15="http://schemas.microsoft.com/office/powerpoint/2012/main"/>
+    </p:ext>
+  </p:extLst>
 </p:presentation>
 </file>
 
@@ -172,7 +177,7 @@
           <a:noFill/>
           <a:extLst>
             <a:ext uri="{909E8E84-426E-40dd-AFC4-6F175D3DCCD1}">
-              <a14:hiddenFill xmlns:a14="http://schemas.microsoft.com/office/drawing/2010/main" xmlns="">
+              <a14:hiddenFill xmlns="" xmlns:a14="http://schemas.microsoft.com/office/drawing/2010/main">
                 <a:solidFill>
                   <a:srgbClr val="FFFFFF"/>
                 </a:solidFill>
@@ -231,7 +236,7 @@
             </a:ln>
             <a:extLst>
               <a:ext uri="{91240B29-F687-4f45-9708-019B960494DF}">
-                <a14:hiddenLine xmlns:a14="http://schemas.microsoft.com/office/drawing/2010/main" xmlns="" w="9525">
+                <a14:hiddenLine xmlns="" xmlns:a14="http://schemas.microsoft.com/office/drawing/2010/main" w="9525">
                   <a:solidFill>
                     <a:srgbClr val="000000"/>
                   </a:solidFill>
@@ -321,7 +326,7 @@
             </a:ln>
             <a:extLst>
               <a:ext uri="{91240B29-F687-4f45-9708-019B960494DF}">
-                <a14:hiddenLine xmlns:a14="http://schemas.microsoft.com/office/drawing/2010/main" xmlns="" w="9525">
+                <a14:hiddenLine xmlns="" xmlns:a14="http://schemas.microsoft.com/office/drawing/2010/main" w="9525">
                   <a:solidFill>
                     <a:srgbClr val="000000"/>
                   </a:solidFill>
@@ -411,7 +416,7 @@
             </a:ln>
             <a:extLst>
               <a:ext uri="{91240B29-F687-4f45-9708-019B960494DF}">
-                <a14:hiddenLine xmlns:a14="http://schemas.microsoft.com/office/drawing/2010/main" xmlns="" w="9525">
+                <a14:hiddenLine xmlns="" xmlns:a14="http://schemas.microsoft.com/office/drawing/2010/main" w="9525">
                   <a:solidFill>
                     <a:srgbClr val="000000"/>
                   </a:solidFill>
@@ -445,7 +450,7 @@
             </a:ln>
             <a:extLst>
               <a:ext uri="{91240B29-F687-4f45-9708-019B960494DF}">
-                <a14:hiddenLine xmlns:a14="http://schemas.microsoft.com/office/drawing/2010/main" xmlns="" w="9525">
+                <a14:hiddenLine xmlns="" xmlns:a14="http://schemas.microsoft.com/office/drawing/2010/main" w="9525">
                   <a:solidFill>
                     <a:srgbClr val="000000"/>
                   </a:solidFill>
@@ -535,7 +540,7 @@
             </a:ln>
             <a:extLst>
               <a:ext uri="{91240B29-F687-4f45-9708-019B960494DF}">
-                <a14:hiddenLine xmlns:a14="http://schemas.microsoft.com/office/drawing/2010/main" xmlns="" w="9525">
+                <a14:hiddenLine xmlns="" xmlns:a14="http://schemas.microsoft.com/office/drawing/2010/main" w="9525">
                   <a:solidFill>
                     <a:srgbClr val="000000"/>
                   </a:solidFill>
@@ -597,7 +602,7 @@
             </a:ln>
             <a:extLst>
               <a:ext uri="{91240B29-F687-4f45-9708-019B960494DF}">
-                <a14:hiddenLine xmlns:a14="http://schemas.microsoft.com/office/drawing/2010/main" xmlns="" w="9525">
+                <a14:hiddenLine xmlns="" xmlns:a14="http://schemas.microsoft.com/office/drawing/2010/main" w="9525">
                   <a:solidFill>
                     <a:srgbClr val="000000"/>
                   </a:solidFill>
@@ -659,7 +664,7 @@
             </a:ln>
             <a:extLst>
               <a:ext uri="{91240B29-F687-4f45-9708-019B960494DF}">
-                <a14:hiddenLine xmlns:a14="http://schemas.microsoft.com/office/drawing/2010/main" xmlns="" w="9525">
+                <a14:hiddenLine xmlns="" xmlns:a14="http://schemas.microsoft.com/office/drawing/2010/main" w="9525">
                   <a:solidFill>
                     <a:srgbClr val="000000"/>
                   </a:solidFill>
@@ -749,7 +754,7 @@
             </a:ln>
             <a:extLst>
               <a:ext uri="{91240B29-F687-4f45-9708-019B960494DF}">
-                <a14:hiddenLine xmlns:a14="http://schemas.microsoft.com/office/drawing/2010/main" xmlns="" w="9525">
+                <a14:hiddenLine xmlns="" xmlns:a14="http://schemas.microsoft.com/office/drawing/2010/main" w="9525">
                   <a:solidFill>
                     <a:srgbClr val="000000"/>
                   </a:solidFill>
@@ -811,7 +816,7 @@
             </a:ln>
             <a:extLst>
               <a:ext uri="{91240B29-F687-4f45-9708-019B960494DF}">
-                <a14:hiddenLine xmlns:a14="http://schemas.microsoft.com/office/drawing/2010/main" xmlns="" w="9525">
+                <a14:hiddenLine xmlns="" xmlns:a14="http://schemas.microsoft.com/office/drawing/2010/main" w="9525">
                   <a:solidFill>
                     <a:srgbClr val="000000"/>
                   </a:solidFill>
@@ -873,7 +878,7 @@
             </a:ln>
             <a:extLst>
               <a:ext uri="{91240B29-F687-4f45-9708-019B960494DF}">
-                <a14:hiddenLine xmlns:a14="http://schemas.microsoft.com/office/drawing/2010/main" xmlns="" w="9525">
+                <a14:hiddenLine xmlns="" xmlns:a14="http://schemas.microsoft.com/office/drawing/2010/main" w="9525">
                   <a:solidFill>
                     <a:srgbClr val="000000"/>
                   </a:solidFill>
@@ -963,7 +968,7 @@
             </a:ln>
             <a:extLst>
               <a:ext uri="{91240B29-F687-4f45-9708-019B960494DF}">
-                <a14:hiddenLine xmlns:a14="http://schemas.microsoft.com/office/drawing/2010/main" xmlns="" w="9525">
+                <a14:hiddenLine xmlns="" xmlns:a14="http://schemas.microsoft.com/office/drawing/2010/main" w="9525">
                   <a:solidFill>
                     <a:srgbClr val="000000"/>
                   </a:solidFill>
@@ -1053,7 +1058,7 @@
             </a:ln>
             <a:extLst>
               <a:ext uri="{91240B29-F687-4f45-9708-019B960494DF}">
-                <a14:hiddenLine xmlns:a14="http://schemas.microsoft.com/office/drawing/2010/main" xmlns="" w="9525">
+                <a14:hiddenLine xmlns="" xmlns:a14="http://schemas.microsoft.com/office/drawing/2010/main" w="9525">
                   <a:solidFill>
                     <a:srgbClr val="000000"/>
                   </a:solidFill>
@@ -1115,7 +1120,7 @@
             </a:ln>
             <a:extLst>
               <a:ext uri="{91240B29-F687-4f45-9708-019B960494DF}">
-                <a14:hiddenLine xmlns:a14="http://schemas.microsoft.com/office/drawing/2010/main" xmlns="" w="9525">
+                <a14:hiddenLine xmlns="" xmlns:a14="http://schemas.microsoft.com/office/drawing/2010/main" w="9525">
                   <a:solidFill>
                     <a:srgbClr val="000000"/>
                   </a:solidFill>
@@ -1225,7 +1230,7 @@
             </a:ln>
             <a:extLst>
               <a:ext uri="{91240B29-F687-4f45-9708-019B960494DF}">
-                <a14:hiddenLine xmlns:a14="http://schemas.microsoft.com/office/drawing/2010/main" xmlns="" w="9525">
+                <a14:hiddenLine xmlns="" xmlns:a14="http://schemas.microsoft.com/office/drawing/2010/main" w="9525">
                   <a:solidFill>
                     <a:srgbClr val="000000"/>
                   </a:solidFill>
@@ -1287,7 +1292,7 @@
             </a:ln>
             <a:extLst>
               <a:ext uri="{91240B29-F687-4f45-9708-019B960494DF}">
-                <a14:hiddenLine xmlns:a14="http://schemas.microsoft.com/office/drawing/2010/main" xmlns="" w="9525">
+                <a14:hiddenLine xmlns="" xmlns:a14="http://schemas.microsoft.com/office/drawing/2010/main" w="9525">
                   <a:solidFill>
                     <a:srgbClr val="000000"/>
                   </a:solidFill>
@@ -1377,7 +1382,7 @@
             </a:ln>
             <a:extLst>
               <a:ext uri="{91240B29-F687-4f45-9708-019B960494DF}">
-                <a14:hiddenLine xmlns:a14="http://schemas.microsoft.com/office/drawing/2010/main" xmlns="" w="9525">
+                <a14:hiddenLine xmlns="" xmlns:a14="http://schemas.microsoft.com/office/drawing/2010/main" w="9525">
                   <a:solidFill>
                     <a:srgbClr val="000000"/>
                   </a:solidFill>
@@ -1467,7 +1472,7 @@
             </a:ln>
             <a:extLst>
               <a:ext uri="{91240B29-F687-4f45-9708-019B960494DF}">
-                <a14:hiddenLine xmlns:a14="http://schemas.microsoft.com/office/drawing/2010/main" xmlns="" w="9525">
+                <a14:hiddenLine xmlns="" xmlns:a14="http://schemas.microsoft.com/office/drawing/2010/main" w="9525">
                   <a:solidFill>
                     <a:srgbClr val="000000"/>
                   </a:solidFill>
@@ -1529,7 +1534,7 @@
             </a:ln>
             <a:extLst>
               <a:ext uri="{91240B29-F687-4f45-9708-019B960494DF}">
-                <a14:hiddenLine xmlns:a14="http://schemas.microsoft.com/office/drawing/2010/main" xmlns="" w="9525">
+                <a14:hiddenLine xmlns="" xmlns:a14="http://schemas.microsoft.com/office/drawing/2010/main" w="9525">
                   <a:solidFill>
                     <a:srgbClr val="000000"/>
                   </a:solidFill>
@@ -1619,7 +1624,7 @@
             </a:ln>
             <a:extLst>
               <a:ext uri="{91240B29-F687-4f45-9708-019B960494DF}">
-                <a14:hiddenLine xmlns:a14="http://schemas.microsoft.com/office/drawing/2010/main" xmlns="" w="9525">
+                <a14:hiddenLine xmlns="" xmlns:a14="http://schemas.microsoft.com/office/drawing/2010/main" w="9525">
                   <a:solidFill>
                     <a:srgbClr val="000000"/>
                   </a:solidFill>
@@ -1709,7 +1714,7 @@
             </a:ln>
             <a:extLst>
               <a:ext uri="{91240B29-F687-4f45-9708-019B960494DF}">
-                <a14:hiddenLine xmlns:a14="http://schemas.microsoft.com/office/drawing/2010/main" xmlns="" w="9525">
+                <a14:hiddenLine xmlns="" xmlns:a14="http://schemas.microsoft.com/office/drawing/2010/main" w="9525">
                   <a:solidFill>
                     <a:srgbClr val="000000"/>
                   </a:solidFill>
@@ -1765,7 +1770,7 @@
             </a:ln>
             <a:extLst>
               <a:ext uri="{91240B29-F687-4f45-9708-019B960494DF}">
-                <a14:hiddenLine xmlns:a14="http://schemas.microsoft.com/office/drawing/2010/main" xmlns="" w="9525">
+                <a14:hiddenLine xmlns="" xmlns:a14="http://schemas.microsoft.com/office/drawing/2010/main" w="9525">
                   <a:solidFill>
                     <a:srgbClr val="000000"/>
                   </a:solidFill>
@@ -1855,7 +1860,7 @@
             </a:ln>
             <a:extLst>
               <a:ext uri="{91240B29-F687-4f45-9708-019B960494DF}">
-                <a14:hiddenLine xmlns:a14="http://schemas.microsoft.com/office/drawing/2010/main" xmlns="" w="9525">
+                <a14:hiddenLine xmlns="" xmlns:a14="http://schemas.microsoft.com/office/drawing/2010/main" w="9525">
                   <a:solidFill>
                     <a:srgbClr val="000000"/>
                   </a:solidFill>
@@ -1911,7 +1916,7 @@
             </a:ln>
             <a:extLst>
               <a:ext uri="{91240B29-F687-4f45-9708-019B960494DF}">
-                <a14:hiddenLine xmlns:a14="http://schemas.microsoft.com/office/drawing/2010/main" xmlns="" w="9525">
+                <a14:hiddenLine xmlns="" xmlns:a14="http://schemas.microsoft.com/office/drawing/2010/main" w="9525">
                   <a:solidFill>
                     <a:srgbClr val="000000"/>
                   </a:solidFill>
@@ -2001,7 +2006,7 @@
             </a:ln>
             <a:extLst>
               <a:ext uri="{91240B29-F687-4f45-9708-019B960494DF}">
-                <a14:hiddenLine xmlns:a14="http://schemas.microsoft.com/office/drawing/2010/main" xmlns="" w="9525">
+                <a14:hiddenLine xmlns="" xmlns:a14="http://schemas.microsoft.com/office/drawing/2010/main" w="9525">
                   <a:solidFill>
                     <a:srgbClr val="000000"/>
                   </a:solidFill>
@@ -2069,7 +2074,7 @@
             </a:ln>
             <a:extLst>
               <a:ext uri="{91240B29-F687-4f45-9708-019B960494DF}">
-                <a14:hiddenLine xmlns:a14="http://schemas.microsoft.com/office/drawing/2010/main" xmlns="" w="9525">
+                <a14:hiddenLine xmlns="" xmlns:a14="http://schemas.microsoft.com/office/drawing/2010/main" w="9525">
                   <a:solidFill>
                     <a:srgbClr val="000000"/>
                   </a:solidFill>
@@ -2159,7 +2164,7 @@
             </a:ln>
             <a:extLst>
               <a:ext uri="{91240B29-F687-4f45-9708-019B960494DF}">
-                <a14:hiddenLine xmlns:a14="http://schemas.microsoft.com/office/drawing/2010/main" xmlns="" w="9525">
+                <a14:hiddenLine xmlns="" xmlns:a14="http://schemas.microsoft.com/office/drawing/2010/main" w="9525">
                   <a:solidFill>
                     <a:srgbClr val="000000"/>
                   </a:solidFill>
@@ -2227,7 +2232,7 @@
             </a:ln>
             <a:extLst>
               <a:ext uri="{91240B29-F687-4f45-9708-019B960494DF}">
-                <a14:hiddenLine xmlns:a14="http://schemas.microsoft.com/office/drawing/2010/main" xmlns="" w="9525">
+                <a14:hiddenLine xmlns="" xmlns:a14="http://schemas.microsoft.com/office/drawing/2010/main" w="9525">
                   <a:solidFill>
                     <a:srgbClr val="000000"/>
                   </a:solidFill>
@@ -2317,7 +2322,7 @@
             </a:ln>
             <a:extLst>
               <a:ext uri="{91240B29-F687-4f45-9708-019B960494DF}">
-                <a14:hiddenLine xmlns:a14="http://schemas.microsoft.com/office/drawing/2010/main" xmlns="" w="9525">
+                <a14:hiddenLine xmlns="" xmlns:a14="http://schemas.microsoft.com/office/drawing/2010/main" w="9525">
                   <a:solidFill>
                     <a:srgbClr val="000000"/>
                   </a:solidFill>
@@ -2351,7 +2356,7 @@
             </a:ln>
             <a:extLst>
               <a:ext uri="{91240B29-F687-4f45-9708-019B960494DF}">
-                <a14:hiddenLine xmlns:a14="http://schemas.microsoft.com/office/drawing/2010/main" xmlns="" w="9525">
+                <a14:hiddenLine xmlns="" xmlns:a14="http://schemas.microsoft.com/office/drawing/2010/main" w="9525">
                   <a:solidFill>
                     <a:srgbClr val="000000"/>
                   </a:solidFill>
@@ -2441,7 +2446,7 @@
             </a:ln>
             <a:extLst>
               <a:ext uri="{91240B29-F687-4f45-9708-019B960494DF}">
-                <a14:hiddenLine xmlns:a14="http://schemas.microsoft.com/office/drawing/2010/main" xmlns="" w="9525">
+                <a14:hiddenLine xmlns="" xmlns:a14="http://schemas.microsoft.com/office/drawing/2010/main" w="9525">
                   <a:solidFill>
                     <a:srgbClr val="000000"/>
                   </a:solidFill>
@@ -2503,7 +2508,7 @@
             </a:ln>
             <a:extLst>
               <a:ext uri="{91240B29-F687-4f45-9708-019B960494DF}">
-                <a14:hiddenLine xmlns:a14="http://schemas.microsoft.com/office/drawing/2010/main" xmlns="" w="9525">
+                <a14:hiddenLine xmlns="" xmlns:a14="http://schemas.microsoft.com/office/drawing/2010/main" w="9525">
                   <a:solidFill>
                     <a:srgbClr val="000000"/>
                   </a:solidFill>
@@ -2565,7 +2570,7 @@
             </a:ln>
             <a:extLst>
               <a:ext uri="{91240B29-F687-4f45-9708-019B960494DF}">
-                <a14:hiddenLine xmlns:a14="http://schemas.microsoft.com/office/drawing/2010/main" xmlns="" w="9525">
+                <a14:hiddenLine xmlns="" xmlns:a14="http://schemas.microsoft.com/office/drawing/2010/main" w="9525">
                   <a:solidFill>
                     <a:srgbClr val="000000"/>
                   </a:solidFill>
@@ -2655,7 +2660,7 @@
             </a:ln>
             <a:extLst>
               <a:ext uri="{91240B29-F687-4f45-9708-019B960494DF}">
-                <a14:hiddenLine xmlns:a14="http://schemas.microsoft.com/office/drawing/2010/main" xmlns="" w="9525">
+                <a14:hiddenLine xmlns="" xmlns:a14="http://schemas.microsoft.com/office/drawing/2010/main" w="9525">
                   <a:solidFill>
                     <a:srgbClr val="000000"/>
                   </a:solidFill>
@@ -2723,7 +2728,7 @@
             </a:ln>
             <a:extLst>
               <a:ext uri="{91240B29-F687-4f45-9708-019B960494DF}">
-                <a14:hiddenLine xmlns:a14="http://schemas.microsoft.com/office/drawing/2010/main" xmlns="" w="9525">
+                <a14:hiddenLine xmlns="" xmlns:a14="http://schemas.microsoft.com/office/drawing/2010/main" w="9525">
                   <a:solidFill>
                     <a:srgbClr val="000000"/>
                   </a:solidFill>
@@ -2785,7 +2790,7 @@
             </a:ln>
             <a:extLst>
               <a:ext uri="{91240B29-F687-4f45-9708-019B960494DF}">
-                <a14:hiddenLine xmlns:a14="http://schemas.microsoft.com/office/drawing/2010/main" xmlns="" w="9525">
+                <a14:hiddenLine xmlns="" xmlns:a14="http://schemas.microsoft.com/office/drawing/2010/main" w="9525">
                   <a:solidFill>
                     <a:srgbClr val="000000"/>
                   </a:solidFill>
@@ -2875,7 +2880,7 @@
             </a:ln>
             <a:extLst>
               <a:ext uri="{91240B29-F687-4f45-9708-019B960494DF}">
-                <a14:hiddenLine xmlns:a14="http://schemas.microsoft.com/office/drawing/2010/main" xmlns="" w="9525">
+                <a14:hiddenLine xmlns="" xmlns:a14="http://schemas.microsoft.com/office/drawing/2010/main" w="9525">
                   <a:solidFill>
                     <a:srgbClr val="000000"/>
                   </a:solidFill>
@@ -2937,7 +2942,7 @@
             </a:ln>
             <a:extLst>
               <a:ext uri="{91240B29-F687-4f45-9708-019B960494DF}">
-                <a14:hiddenLine xmlns:a14="http://schemas.microsoft.com/office/drawing/2010/main" xmlns="" w="9525">
+                <a14:hiddenLine xmlns="" xmlns:a14="http://schemas.microsoft.com/office/drawing/2010/main" w="9525">
                   <a:solidFill>
                     <a:srgbClr val="000000"/>
                   </a:solidFill>
@@ -3027,7 +3032,7 @@
             </a:ln>
             <a:extLst>
               <a:ext uri="{91240B29-F687-4f45-9708-019B960494DF}">
-                <a14:hiddenLine xmlns:a14="http://schemas.microsoft.com/office/drawing/2010/main" xmlns="" w="9525">
+                <a14:hiddenLine xmlns="" xmlns:a14="http://schemas.microsoft.com/office/drawing/2010/main" w="9525">
                   <a:solidFill>
                     <a:srgbClr val="000000"/>
                   </a:solidFill>
@@ -3089,7 +3094,7 @@
             </a:ln>
             <a:extLst>
               <a:ext uri="{91240B29-F687-4f45-9708-019B960494DF}">
-                <a14:hiddenLine xmlns:a14="http://schemas.microsoft.com/office/drawing/2010/main" xmlns="" w="9525">
+                <a14:hiddenLine xmlns="" xmlns:a14="http://schemas.microsoft.com/office/drawing/2010/main" w="9525">
                   <a:solidFill>
                     <a:srgbClr val="000000"/>
                   </a:solidFill>
@@ -3179,7 +3184,7 @@
             </a:ln>
             <a:extLst>
               <a:ext uri="{91240B29-F687-4f45-9708-019B960494DF}">
-                <a14:hiddenLine xmlns:a14="http://schemas.microsoft.com/office/drawing/2010/main" xmlns="" w="9525">
+                <a14:hiddenLine xmlns="" xmlns:a14="http://schemas.microsoft.com/office/drawing/2010/main" w="9525">
                   <a:solidFill>
                     <a:srgbClr val="000000"/>
                   </a:solidFill>
@@ -3213,7 +3218,7 @@
             </a:ln>
             <a:extLst>
               <a:ext uri="{91240B29-F687-4f45-9708-019B960494DF}">
-                <a14:hiddenLine xmlns:a14="http://schemas.microsoft.com/office/drawing/2010/main" xmlns="" w="9525">
+                <a14:hiddenLine xmlns="" xmlns:a14="http://schemas.microsoft.com/office/drawing/2010/main" w="9525">
                   <a:solidFill>
                     <a:srgbClr val="000000"/>
                   </a:solidFill>
@@ -3278,7 +3283,7 @@
             </a:ln>
             <a:extLst>
               <a:ext uri="{91240B29-F687-4f45-9708-019B960494DF}">
-                <a14:hiddenLine xmlns:a14="http://schemas.microsoft.com/office/drawing/2010/main" xmlns="" w="9525">
+                <a14:hiddenLine xmlns="" xmlns:a14="http://schemas.microsoft.com/office/drawing/2010/main" w="9525">
                   <a:solidFill>
                     <a:srgbClr val="000000"/>
                   </a:solidFill>
@@ -3368,7 +3373,7 @@
             </a:ln>
             <a:extLst>
               <a:ext uri="{91240B29-F687-4f45-9708-019B960494DF}">
-                <a14:hiddenLine xmlns:a14="http://schemas.microsoft.com/office/drawing/2010/main" xmlns="" w="9525">
+                <a14:hiddenLine xmlns="" xmlns:a14="http://schemas.microsoft.com/office/drawing/2010/main" w="9525">
                   <a:solidFill>
                     <a:srgbClr val="000000"/>
                   </a:solidFill>
@@ -3430,7 +3435,7 @@
             </a:ln>
             <a:extLst>
               <a:ext uri="{91240B29-F687-4f45-9708-019B960494DF}">
-                <a14:hiddenLine xmlns:a14="http://schemas.microsoft.com/office/drawing/2010/main" xmlns="" w="9525">
+                <a14:hiddenLine xmlns="" xmlns:a14="http://schemas.microsoft.com/office/drawing/2010/main" w="9525">
                   <a:solidFill>
                     <a:srgbClr val="000000"/>
                   </a:solidFill>
@@ -3520,7 +3525,7 @@
             </a:ln>
             <a:extLst>
               <a:ext uri="{91240B29-F687-4f45-9708-019B960494DF}">
-                <a14:hiddenLine xmlns:a14="http://schemas.microsoft.com/office/drawing/2010/main" xmlns="" w="9525">
+                <a14:hiddenLine xmlns="" xmlns:a14="http://schemas.microsoft.com/office/drawing/2010/main" w="9525">
                   <a:solidFill>
                     <a:srgbClr val="000000"/>
                   </a:solidFill>
@@ -3610,7 +3615,7 @@
             </a:ln>
             <a:extLst>
               <a:ext uri="{91240B29-F687-4f45-9708-019B960494DF}">
-                <a14:hiddenLine xmlns:a14="http://schemas.microsoft.com/office/drawing/2010/main" xmlns="" w="9525">
+                <a14:hiddenLine xmlns="" xmlns:a14="http://schemas.microsoft.com/office/drawing/2010/main" w="9525">
                   <a:solidFill>
                     <a:srgbClr val="000000"/>
                   </a:solidFill>
@@ -3675,7 +3680,7 @@
             </a:ln>
             <a:extLst>
               <a:ext uri="{91240B29-F687-4f45-9708-019B960494DF}">
-                <a14:hiddenLine xmlns:a14="http://schemas.microsoft.com/office/drawing/2010/main" xmlns="" w="9525">
+                <a14:hiddenLine xmlns="" xmlns:a14="http://schemas.microsoft.com/office/drawing/2010/main" w="9525">
                   <a:solidFill>
                     <a:srgbClr val="000000"/>
                   </a:solidFill>
@@ -3737,7 +3742,7 @@
             </a:ln>
             <a:extLst>
               <a:ext uri="{91240B29-F687-4f45-9708-019B960494DF}">
-                <a14:hiddenLine xmlns:a14="http://schemas.microsoft.com/office/drawing/2010/main" xmlns="" w="9525">
+                <a14:hiddenLine xmlns="" xmlns:a14="http://schemas.microsoft.com/office/drawing/2010/main" w="9525">
                   <a:solidFill>
                     <a:srgbClr val="000000"/>
                   </a:solidFill>
@@ -3827,7 +3832,7 @@
             </a:ln>
             <a:extLst>
               <a:ext uri="{91240B29-F687-4f45-9708-019B960494DF}">
-                <a14:hiddenLine xmlns:a14="http://schemas.microsoft.com/office/drawing/2010/main" xmlns="" w="9525">
+                <a14:hiddenLine xmlns="" xmlns:a14="http://schemas.microsoft.com/office/drawing/2010/main" w="9525">
                   <a:solidFill>
                     <a:srgbClr val="000000"/>
                   </a:solidFill>
@@ -3917,7 +3922,7 @@
             </a:ln>
             <a:extLst>
               <a:ext uri="{91240B29-F687-4f45-9708-019B960494DF}">
-                <a14:hiddenLine xmlns:a14="http://schemas.microsoft.com/office/drawing/2010/main" xmlns="" w="9525">
+                <a14:hiddenLine xmlns="" xmlns:a14="http://schemas.microsoft.com/office/drawing/2010/main" w="9525">
                   <a:solidFill>
                     <a:srgbClr val="000000"/>
                   </a:solidFill>
@@ -3979,7 +3984,7 @@
             </a:ln>
             <a:extLst>
               <a:ext uri="{91240B29-F687-4f45-9708-019B960494DF}">
-                <a14:hiddenLine xmlns:a14="http://schemas.microsoft.com/office/drawing/2010/main" xmlns="" w="9525">
+                <a14:hiddenLine xmlns="" xmlns:a14="http://schemas.microsoft.com/office/drawing/2010/main" w="9525">
                   <a:solidFill>
                     <a:srgbClr val="000000"/>
                   </a:solidFill>
@@ -4099,7 +4104,7 @@
             </a:ln>
             <a:extLst>
               <a:ext uri="{91240B29-F687-4f45-9708-019B960494DF}">
-                <a14:hiddenLine xmlns:a14="http://schemas.microsoft.com/office/drawing/2010/main" xmlns="" w="9525">
+                <a14:hiddenLine xmlns="" xmlns:a14="http://schemas.microsoft.com/office/drawing/2010/main" w="9525">
                   <a:solidFill>
                     <a:srgbClr val="000000"/>
                   </a:solidFill>
@@ -4167,7 +4172,7 @@
             </a:ln>
             <a:extLst>
               <a:ext uri="{91240B29-F687-4f45-9708-019B960494DF}">
-                <a14:hiddenLine xmlns:a14="http://schemas.microsoft.com/office/drawing/2010/main" xmlns="" w="9525">
+                <a14:hiddenLine xmlns="" xmlns:a14="http://schemas.microsoft.com/office/drawing/2010/main" w="9525">
                   <a:solidFill>
                     <a:srgbClr val="000000"/>
                   </a:solidFill>
@@ -4257,7 +4262,7 @@
             </a:ln>
             <a:extLst>
               <a:ext uri="{91240B29-F687-4f45-9708-019B960494DF}">
-                <a14:hiddenLine xmlns:a14="http://schemas.microsoft.com/office/drawing/2010/main" xmlns="" w="9525">
+                <a14:hiddenLine xmlns="" xmlns:a14="http://schemas.microsoft.com/office/drawing/2010/main" w="9525">
                   <a:solidFill>
                     <a:srgbClr val="000000"/>
                   </a:solidFill>
@@ -8986,7 +8991,7 @@
           <a:noFill/>
           <a:extLst>
             <a:ext uri="{909E8E84-426E-40dd-AFC4-6F175D3DCCD1}">
-              <a14:hiddenFill xmlns:a14="http://schemas.microsoft.com/office/drawing/2010/main" xmlns="">
+              <a14:hiddenFill xmlns="" xmlns:a14="http://schemas.microsoft.com/office/drawing/2010/main">
                 <a:solidFill>
                   <a:srgbClr val="FFFFFF"/>
                 </a:solidFill>
@@ -9060,7 +9065,7 @@
               </a:ln>
               <a:extLst>
                 <a:ext uri="{91240B29-F687-4f45-9708-019B960494DF}">
-                  <a14:hiddenLine xmlns:a14="http://schemas.microsoft.com/office/drawing/2010/main" xmlns="" w="9525">
+                  <a14:hiddenLine xmlns="" xmlns:a14="http://schemas.microsoft.com/office/drawing/2010/main" w="9525">
                     <a:solidFill>
                       <a:srgbClr val="000000"/>
                     </a:solidFill>
@@ -9150,7 +9155,7 @@
               </a:ln>
               <a:extLst>
                 <a:ext uri="{91240B29-F687-4f45-9708-019B960494DF}">
-                  <a14:hiddenLine xmlns:a14="http://schemas.microsoft.com/office/drawing/2010/main" xmlns="" w="9525">
+                  <a14:hiddenLine xmlns="" xmlns:a14="http://schemas.microsoft.com/office/drawing/2010/main" w="9525">
                     <a:solidFill>
                       <a:srgbClr val="000000"/>
                     </a:solidFill>
@@ -9240,7 +9245,7 @@
               </a:ln>
               <a:extLst>
                 <a:ext uri="{91240B29-F687-4f45-9708-019B960494DF}">
-                  <a14:hiddenLine xmlns:a14="http://schemas.microsoft.com/office/drawing/2010/main" xmlns="" w="9525">
+                  <a14:hiddenLine xmlns="" xmlns:a14="http://schemas.microsoft.com/office/drawing/2010/main" w="9525">
                     <a:solidFill>
                       <a:srgbClr val="000000"/>
                     </a:solidFill>
@@ -9302,7 +9307,7 @@
               </a:ln>
               <a:extLst>
                 <a:ext uri="{91240B29-F687-4f45-9708-019B960494DF}">
-                  <a14:hiddenLine xmlns:a14="http://schemas.microsoft.com/office/drawing/2010/main" xmlns="" w="9525">
+                  <a14:hiddenLine xmlns="" xmlns:a14="http://schemas.microsoft.com/office/drawing/2010/main" w="9525">
                     <a:solidFill>
                       <a:srgbClr val="000000"/>
                     </a:solidFill>
@@ -9392,7 +9397,7 @@
               </a:ln>
               <a:extLst>
                 <a:ext uri="{91240B29-F687-4f45-9708-019B960494DF}">
-                  <a14:hiddenLine xmlns:a14="http://schemas.microsoft.com/office/drawing/2010/main" xmlns="" w="9525">
+                  <a14:hiddenLine xmlns="" xmlns:a14="http://schemas.microsoft.com/office/drawing/2010/main" w="9525">
                     <a:solidFill>
                       <a:srgbClr val="000000"/>
                     </a:solidFill>
@@ -9454,7 +9459,7 @@
               </a:ln>
               <a:extLst>
                 <a:ext uri="{91240B29-F687-4f45-9708-019B960494DF}">
-                  <a14:hiddenLine xmlns:a14="http://schemas.microsoft.com/office/drawing/2010/main" xmlns="" w="9525">
+                  <a14:hiddenLine xmlns="" xmlns:a14="http://schemas.microsoft.com/office/drawing/2010/main" w="9525">
                     <a:solidFill>
                       <a:srgbClr val="000000"/>
                     </a:solidFill>
@@ -9516,7 +9521,7 @@
               </a:ln>
               <a:extLst>
                 <a:ext uri="{91240B29-F687-4f45-9708-019B960494DF}">
-                  <a14:hiddenLine xmlns:a14="http://schemas.microsoft.com/office/drawing/2010/main" xmlns="" w="9525">
+                  <a14:hiddenLine xmlns="" xmlns:a14="http://schemas.microsoft.com/office/drawing/2010/main" w="9525">
                     <a:solidFill>
                       <a:srgbClr val="000000"/>
                     </a:solidFill>
@@ -9606,7 +9611,7 @@
               </a:ln>
               <a:extLst>
                 <a:ext uri="{91240B29-F687-4f45-9708-019B960494DF}">
-                  <a14:hiddenLine xmlns:a14="http://schemas.microsoft.com/office/drawing/2010/main" xmlns="" w="9525">
+                  <a14:hiddenLine xmlns="" xmlns:a14="http://schemas.microsoft.com/office/drawing/2010/main" w="9525">
                     <a:solidFill>
                       <a:srgbClr val="000000"/>
                     </a:solidFill>
@@ -9696,7 +9701,7 @@
               </a:ln>
               <a:extLst>
                 <a:ext uri="{91240B29-F687-4f45-9708-019B960494DF}">
-                  <a14:hiddenLine xmlns:a14="http://schemas.microsoft.com/office/drawing/2010/main" xmlns="" w="9525">
+                  <a14:hiddenLine xmlns="" xmlns:a14="http://schemas.microsoft.com/office/drawing/2010/main" w="9525">
                     <a:solidFill>
                       <a:srgbClr val="000000"/>
                     </a:solidFill>
@@ -9758,7 +9763,7 @@
               </a:ln>
               <a:extLst>
                 <a:ext uri="{91240B29-F687-4f45-9708-019B960494DF}">
-                  <a14:hiddenLine xmlns:a14="http://schemas.microsoft.com/office/drawing/2010/main" xmlns="" w="9525">
+                  <a14:hiddenLine xmlns="" xmlns:a14="http://schemas.microsoft.com/office/drawing/2010/main" w="9525">
                     <a:solidFill>
                       <a:srgbClr val="000000"/>
                     </a:solidFill>
@@ -9868,7 +9873,7 @@
               </a:ln>
               <a:extLst>
                 <a:ext uri="{91240B29-F687-4f45-9708-019B960494DF}">
-                  <a14:hiddenLine xmlns:a14="http://schemas.microsoft.com/office/drawing/2010/main" xmlns="" w="9525">
+                  <a14:hiddenLine xmlns="" xmlns:a14="http://schemas.microsoft.com/office/drawing/2010/main" w="9525">
                     <a:solidFill>
                       <a:srgbClr val="000000"/>
                     </a:solidFill>
@@ -9952,7 +9957,7 @@
               </a:ln>
               <a:extLst>
                 <a:ext uri="{91240B29-F687-4f45-9708-019B960494DF}">
-                  <a14:hiddenLine xmlns:a14="http://schemas.microsoft.com/office/drawing/2010/main" xmlns="" w="9525">
+                  <a14:hiddenLine xmlns="" xmlns:a14="http://schemas.microsoft.com/office/drawing/2010/main" w="9525">
                     <a:solidFill>
                       <a:srgbClr val="000000"/>
                     </a:solidFill>
@@ -10014,7 +10019,7 @@
               </a:ln>
               <a:extLst>
                 <a:ext uri="{91240B29-F687-4f45-9708-019B960494DF}">
-                  <a14:hiddenLine xmlns:a14="http://schemas.microsoft.com/office/drawing/2010/main" xmlns="" w="9525">
+                  <a14:hiddenLine xmlns="" xmlns:a14="http://schemas.microsoft.com/office/drawing/2010/main" w="9525">
                     <a:solidFill>
                       <a:srgbClr val="000000"/>
                     </a:solidFill>
@@ -10076,7 +10081,7 @@
               </a:ln>
               <a:extLst>
                 <a:ext uri="{91240B29-F687-4f45-9708-019B960494DF}">
-                  <a14:hiddenLine xmlns:a14="http://schemas.microsoft.com/office/drawing/2010/main" xmlns="" w="9525">
+                  <a14:hiddenLine xmlns="" xmlns:a14="http://schemas.microsoft.com/office/drawing/2010/main" w="9525">
                     <a:solidFill>
                       <a:srgbClr val="000000"/>
                     </a:solidFill>
@@ -10166,7 +10171,7 @@
               </a:ln>
               <a:extLst>
                 <a:ext uri="{91240B29-F687-4f45-9708-019B960494DF}">
-                  <a14:hiddenLine xmlns:a14="http://schemas.microsoft.com/office/drawing/2010/main" xmlns="" w="9525">
+                  <a14:hiddenLine xmlns="" xmlns:a14="http://schemas.microsoft.com/office/drawing/2010/main" w="9525">
                     <a:solidFill>
                       <a:srgbClr val="000000"/>
                     </a:solidFill>
@@ -10200,7 +10205,7 @@
               </a:ln>
               <a:extLst>
                 <a:ext uri="{91240B29-F687-4f45-9708-019B960494DF}">
-                  <a14:hiddenLine xmlns:a14="http://schemas.microsoft.com/office/drawing/2010/main" xmlns="" w="9525">
+                  <a14:hiddenLine xmlns="" xmlns:a14="http://schemas.microsoft.com/office/drawing/2010/main" w="9525">
                     <a:solidFill>
                       <a:srgbClr val="000000"/>
                     </a:solidFill>
@@ -10265,7 +10270,7 @@
               </a:ln>
               <a:extLst>
                 <a:ext uri="{91240B29-F687-4f45-9708-019B960494DF}">
-                  <a14:hiddenLine xmlns:a14="http://schemas.microsoft.com/office/drawing/2010/main" xmlns="" w="9525">
+                  <a14:hiddenLine xmlns="" xmlns:a14="http://schemas.microsoft.com/office/drawing/2010/main" w="9525">
                     <a:solidFill>
                       <a:srgbClr val="000000"/>
                     </a:solidFill>
@@ -10355,7 +10360,7 @@
               </a:ln>
               <a:extLst>
                 <a:ext uri="{91240B29-F687-4f45-9708-019B960494DF}">
-                  <a14:hiddenLine xmlns:a14="http://schemas.microsoft.com/office/drawing/2010/main" xmlns="" w="9525">
+                  <a14:hiddenLine xmlns="" xmlns:a14="http://schemas.microsoft.com/office/drawing/2010/main" w="9525">
                     <a:solidFill>
                       <a:srgbClr val="000000"/>
                     </a:solidFill>
@@ -10417,7 +10422,7 @@
               </a:ln>
               <a:extLst>
                 <a:ext uri="{91240B29-F687-4f45-9708-019B960494DF}">
-                  <a14:hiddenLine xmlns:a14="http://schemas.microsoft.com/office/drawing/2010/main" xmlns="" w="9525">
+                  <a14:hiddenLine xmlns="" xmlns:a14="http://schemas.microsoft.com/office/drawing/2010/main" w="9525">
                     <a:solidFill>
                       <a:srgbClr val="000000"/>
                     </a:solidFill>
@@ -10507,7 +10512,7 @@
               </a:ln>
               <a:extLst>
                 <a:ext uri="{91240B29-F687-4f45-9708-019B960494DF}">
-                  <a14:hiddenLine xmlns:a14="http://schemas.microsoft.com/office/drawing/2010/main" xmlns="" w="9525">
+                  <a14:hiddenLine xmlns="" xmlns:a14="http://schemas.microsoft.com/office/drawing/2010/main" w="9525">
                     <a:solidFill>
                       <a:srgbClr val="000000"/>
                     </a:solidFill>
@@ -10572,7 +10577,7 @@
               </a:ln>
               <a:extLst>
                 <a:ext uri="{91240B29-F687-4f45-9708-019B960494DF}">
-                  <a14:hiddenLine xmlns:a14="http://schemas.microsoft.com/office/drawing/2010/main" xmlns="" w="9525">
+                  <a14:hiddenLine xmlns="" xmlns:a14="http://schemas.microsoft.com/office/drawing/2010/main" w="9525">
                     <a:solidFill>
                       <a:srgbClr val="000000"/>
                     </a:solidFill>
@@ -10634,7 +10639,7 @@
               </a:ln>
               <a:extLst>
                 <a:ext uri="{91240B29-F687-4f45-9708-019B960494DF}">
-                  <a14:hiddenLine xmlns:a14="http://schemas.microsoft.com/office/drawing/2010/main" xmlns="" w="9525">
+                  <a14:hiddenLine xmlns="" xmlns:a14="http://schemas.microsoft.com/office/drawing/2010/main" w="9525">
                     <a:solidFill>
                       <a:srgbClr val="000000"/>
                     </a:solidFill>
@@ -10724,7 +10729,7 @@
               </a:ln>
               <a:extLst>
                 <a:ext uri="{91240B29-F687-4f45-9708-019B960494DF}">
-                  <a14:hiddenLine xmlns:a14="http://schemas.microsoft.com/office/drawing/2010/main" xmlns="" w="9525">
+                  <a14:hiddenLine xmlns="" xmlns:a14="http://schemas.microsoft.com/office/drawing/2010/main" w="9525">
                     <a:solidFill>
                       <a:srgbClr val="000000"/>
                     </a:solidFill>
@@ -10814,7 +10819,7 @@
               </a:ln>
               <a:extLst>
                 <a:ext uri="{91240B29-F687-4f45-9708-019B960494DF}">
-                  <a14:hiddenLine xmlns:a14="http://schemas.microsoft.com/office/drawing/2010/main" xmlns="" w="9525">
+                  <a14:hiddenLine xmlns="" xmlns:a14="http://schemas.microsoft.com/office/drawing/2010/main" w="9525">
                     <a:solidFill>
                       <a:srgbClr val="000000"/>
                     </a:solidFill>
@@ -10879,7 +10884,7 @@
               </a:ln>
               <a:extLst>
                 <a:ext uri="{91240B29-F687-4f45-9708-019B960494DF}">
-                  <a14:hiddenLine xmlns:a14="http://schemas.microsoft.com/office/drawing/2010/main" xmlns="" w="9525">
+                  <a14:hiddenLine xmlns="" xmlns:a14="http://schemas.microsoft.com/office/drawing/2010/main" w="9525">
                     <a:solidFill>
                       <a:srgbClr val="000000"/>
                     </a:solidFill>
@@ -10999,7 +11004,7 @@
               </a:ln>
               <a:extLst>
                 <a:ext uri="{91240B29-F687-4f45-9708-019B960494DF}">
-                  <a14:hiddenLine xmlns:a14="http://schemas.microsoft.com/office/drawing/2010/main" xmlns="" w="9525">
+                  <a14:hiddenLine xmlns="" xmlns:a14="http://schemas.microsoft.com/office/drawing/2010/main" w="9525">
                     <a:solidFill>
                       <a:srgbClr val="000000"/>
                     </a:solidFill>
@@ -11080,7 +11085,7 @@
               </a:ln>
               <a:extLst>
                 <a:ext uri="{91240B29-F687-4f45-9708-019B960494DF}">
-                  <a14:hiddenLine xmlns:a14="http://schemas.microsoft.com/office/drawing/2010/main" xmlns="" w="9525">
+                  <a14:hiddenLine xmlns="" xmlns:a14="http://schemas.microsoft.com/office/drawing/2010/main" w="9525">
                     <a:solidFill>
                       <a:srgbClr val="000000"/>
                     </a:solidFill>
@@ -11195,7 +11200,7 @@
               </a:ln>
               <a:extLst>
                 <a:ext uri="{91240B29-F687-4f45-9708-019B960494DF}">
-                  <a14:hiddenLine xmlns:a14="http://schemas.microsoft.com/office/drawing/2010/main" xmlns="" w="9525">
+                  <a14:hiddenLine xmlns="" xmlns:a14="http://schemas.microsoft.com/office/drawing/2010/main" w="9525">
                     <a:solidFill>
                       <a:srgbClr val="000000"/>
                     </a:solidFill>
@@ -11285,7 +11290,7 @@
               </a:ln>
               <a:extLst>
                 <a:ext uri="{91240B29-F687-4f45-9708-019B960494DF}">
-                  <a14:hiddenLine xmlns:a14="http://schemas.microsoft.com/office/drawing/2010/main" xmlns="" w="9525">
+                  <a14:hiddenLine xmlns="" xmlns:a14="http://schemas.microsoft.com/office/drawing/2010/main" w="9525">
                     <a:solidFill>
                       <a:srgbClr val="000000"/>
                     </a:solidFill>
@@ -11350,7 +11355,7 @@
               </a:ln>
               <a:extLst>
                 <a:ext uri="{91240B29-F687-4f45-9708-019B960494DF}">
-                  <a14:hiddenLine xmlns:a14="http://schemas.microsoft.com/office/drawing/2010/main" xmlns="" w="9525">
+                  <a14:hiddenLine xmlns="" xmlns:a14="http://schemas.microsoft.com/office/drawing/2010/main" w="9525">
                     <a:solidFill>
                       <a:srgbClr val="000000"/>
                     </a:solidFill>
@@ -11440,7 +11445,7 @@
               </a:ln>
               <a:extLst>
                 <a:ext uri="{91240B29-F687-4f45-9708-019B960494DF}">
-                  <a14:hiddenLine xmlns:a14="http://schemas.microsoft.com/office/drawing/2010/main" xmlns="" w="9525">
+                  <a14:hiddenLine xmlns="" xmlns:a14="http://schemas.microsoft.com/office/drawing/2010/main" w="9525">
                     <a:solidFill>
                       <a:srgbClr val="000000"/>
                     </a:solidFill>
@@ -11508,7 +11513,7 @@
               </a:ln>
               <a:extLst>
                 <a:ext uri="{91240B29-F687-4f45-9708-019B960494DF}">
-                  <a14:hiddenLine xmlns:a14="http://schemas.microsoft.com/office/drawing/2010/main" xmlns="" w="9525">
+                  <a14:hiddenLine xmlns="" xmlns:a14="http://schemas.microsoft.com/office/drawing/2010/main" w="9525">
                     <a:solidFill>
                       <a:srgbClr val="000000"/>
                     </a:solidFill>
@@ -11598,7 +11603,7 @@
               </a:ln>
               <a:extLst>
                 <a:ext uri="{91240B29-F687-4f45-9708-019B960494DF}">
-                  <a14:hiddenLine xmlns:a14="http://schemas.microsoft.com/office/drawing/2010/main" xmlns="" w="9525">
+                  <a14:hiddenLine xmlns="" xmlns:a14="http://schemas.microsoft.com/office/drawing/2010/main" w="9525">
                     <a:solidFill>
                       <a:srgbClr val="000000"/>
                     </a:solidFill>
@@ -11666,7 +11671,7 @@
               </a:ln>
               <a:extLst>
                 <a:ext uri="{91240B29-F687-4f45-9708-019B960494DF}">
-                  <a14:hiddenLine xmlns:a14="http://schemas.microsoft.com/office/drawing/2010/main" xmlns="" w="9525">
+                  <a14:hiddenLine xmlns="" xmlns:a14="http://schemas.microsoft.com/office/drawing/2010/main" w="9525">
                     <a:solidFill>
                       <a:srgbClr val="000000"/>
                     </a:solidFill>
@@ -11756,7 +11761,7 @@
               </a:ln>
               <a:extLst>
                 <a:ext uri="{91240B29-F687-4f45-9708-019B960494DF}">
-                  <a14:hiddenLine xmlns:a14="http://schemas.microsoft.com/office/drawing/2010/main" xmlns="" w="9525">
+                  <a14:hiddenLine xmlns="" xmlns:a14="http://schemas.microsoft.com/office/drawing/2010/main" w="9525">
                     <a:solidFill>
                       <a:srgbClr val="000000"/>
                     </a:solidFill>
@@ -11790,7 +11795,7 @@
               </a:ln>
               <a:extLst>
                 <a:ext uri="{91240B29-F687-4f45-9708-019B960494DF}">
-                  <a14:hiddenLine xmlns:a14="http://schemas.microsoft.com/office/drawing/2010/main" xmlns="" w="9525">
+                  <a14:hiddenLine xmlns="" xmlns:a14="http://schemas.microsoft.com/office/drawing/2010/main" w="9525">
                     <a:solidFill>
                       <a:srgbClr val="000000"/>
                     </a:solidFill>
@@ -12590,6 +12595,128 @@
           </a:p>
         </p:txBody>
       </p:sp>
+      <p:sp>
+        <p:nvSpPr>
+          <p:cNvPr id="3" name="TextBox 2">
+            <a:extLst>
+              <a:ext uri="{FF2B5EF4-FFF2-40B4-BE49-F238E27FC236}">
+                <a16:creationId xmlns:a16="http://schemas.microsoft.com/office/drawing/2014/main" id="{D2124173-64A1-4D12-AB2F-00C4AEC27E67}"/>
+              </a:ext>
+            </a:extLst>
+          </p:cNvPr>
+          <p:cNvSpPr txBox="1"/>
+          <p:nvPr/>
+        </p:nvSpPr>
+        <p:spPr>
+          <a:xfrm>
+            <a:off x="1272209" y="2014627"/>
+            <a:ext cx="6758609" cy="2862322"/>
+          </a:xfrm>
+          <a:prstGeom prst="rect">
+            <a:avLst/>
+          </a:prstGeom>
+          <a:noFill/>
+        </p:spPr>
+        <p:txBody>
+          <a:bodyPr wrap="square" rtlCol="0">
+            <a:spAutoFit/>
+          </a:bodyPr>
+          <a:lstStyle/>
+          <a:p>
+            <a:r>
+              <a:rPr lang="en-US" dirty="0"/>
+              <a:t>Learner should have a basic foundation on</a:t>
+            </a:r>
+          </a:p>
+          <a:p>
+            <a:pPr marL="742950" lvl="1" indent="-285750">
+              <a:buFont typeface="Arial" panose="020B0604020202020204" pitchFamily="34" charset="0"/>
+              <a:buChar char="•"/>
+            </a:pPr>
+            <a:r>
+              <a:rPr lang="en-US" dirty="0"/>
+              <a:t>Download software from a link</a:t>
+            </a:r>
+          </a:p>
+          <a:p>
+            <a:pPr marL="742950" lvl="1" indent="-285750">
+              <a:buFont typeface="Arial" panose="020B0604020202020204" pitchFamily="34" charset="0"/>
+              <a:buChar char="•"/>
+            </a:pPr>
+            <a:r>
+              <a:rPr lang="en-US" dirty="0"/>
+              <a:t>Install software from downloaded .exe file</a:t>
+            </a:r>
+          </a:p>
+          <a:p>
+            <a:r>
+              <a:rPr lang="en-US" dirty="0"/>
+              <a:t>Learner should have access to</a:t>
+            </a:r>
+          </a:p>
+          <a:p>
+            <a:pPr marL="742950" lvl="1" indent="-285750">
+              <a:buFont typeface="Arial" panose="020B0604020202020204" pitchFamily="34" charset="0"/>
+              <a:buChar char="•"/>
+            </a:pPr>
+            <a:r>
+              <a:rPr lang="en-US" dirty="0"/>
+              <a:t>Personal Computer</a:t>
+            </a:r>
+          </a:p>
+          <a:p>
+            <a:pPr marL="742950" lvl="1" indent="-285750">
+              <a:buFont typeface="Arial" panose="020B0604020202020204" pitchFamily="34" charset="0"/>
+              <a:buChar char="•"/>
+            </a:pPr>
+            <a:r>
+              <a:rPr lang="en-US" dirty="0"/>
+              <a:t>Reliable High-Speed internet connection</a:t>
+            </a:r>
+          </a:p>
+          <a:p>
+            <a:pPr marL="742950" lvl="1" indent="-285750">
+              <a:buFont typeface="Arial" panose="020B0604020202020204" pitchFamily="34" charset="0"/>
+              <a:buChar char="•"/>
+            </a:pPr>
+            <a:r>
+              <a:rPr lang="en-US" dirty="0"/>
+              <a:t>Adequate hard drive storage space (~2TB)</a:t>
+            </a:r>
+          </a:p>
+          <a:p>
+            <a:pPr marL="742950" lvl="1" indent="-285750">
+              <a:buFont typeface="Arial" panose="020B0604020202020204" pitchFamily="34" charset="0"/>
+              <a:buChar char="•"/>
+            </a:pPr>
+            <a:r>
+              <a:rPr lang="en-US" dirty="0"/>
+              <a:t>Headphones or </a:t>
+            </a:r>
+            <a:r>
+              <a:rPr lang="en-US"/>
+              <a:t>other speakers</a:t>
+            </a:r>
+          </a:p>
+          <a:p>
+            <a:pPr marL="742950" lvl="1" indent="-285750">
+              <a:buFont typeface="Arial" panose="020B0604020202020204" pitchFamily="34" charset="0"/>
+              <a:buChar char="•"/>
+            </a:pPr>
+            <a:r>
+              <a:rPr lang="en-US" dirty="0"/>
+              <a:t>	</a:t>
+            </a:r>
+          </a:p>
+          <a:p>
+            <a:pPr marL="285750" indent="-285750">
+              <a:buFont typeface="Arial" panose="020B0604020202020204" pitchFamily="34" charset="0"/>
+              <a:buChar char="•"/>
+            </a:pPr>
+            <a:endParaRPr lang="en-US" dirty="0"/>
+          </a:p>
+        </p:txBody>
+      </p:sp>
     </p:spTree>
     <p:extLst>
       <p:ext uri="{BB962C8B-B14F-4D97-AF65-F5344CB8AC3E}">

</xml_diff>